<commit_message>
Update Clean Code - Chapter 6.pptx
Completed reading chapter 6 - objects and data structures
</commit_message>
<xml_diff>
--- a/Clean Code - Chapter 6.pptx
+++ b/Clean Code - Chapter 6.pptx
@@ -10,6 +10,14 @@
     <p:sldId id="258" r:id="rId4"/>
     <p:sldId id="259" r:id="rId5"/>
     <p:sldId id="260" r:id="rId6"/>
+    <p:sldId id="261" r:id="rId7"/>
+    <p:sldId id="262" r:id="rId8"/>
+    <p:sldId id="263" r:id="rId9"/>
+    <p:sldId id="264" r:id="rId10"/>
+    <p:sldId id="265" r:id="rId11"/>
+    <p:sldId id="266" r:id="rId12"/>
+    <p:sldId id="267" r:id="rId13"/>
+    <p:sldId id="268" r:id="rId14"/>
   </p:sldIdLst>
   <p:sldSz cx="12192000" cy="6858000"/>
   <p:notesSz cx="6858000" cy="9144000"/>
@@ -263,7 +271,7 @@
           <a:p>
             <a:fld id="{82EDB8D0-98ED-4B86-9D5F-E61ADC70144D}" type="datetimeFigureOut">
               <a:rPr lang="en-US" smtClean="0"/>
-              <a:t>13-Jul-25</a:t>
+              <a:t>14-Jul-25</a:t>
             </a:fld>
             <a:endParaRPr lang="en-US" dirty="0"/>
           </a:p>
@@ -678,7 +686,7 @@
           <a:p>
             <a:fld id="{82EDB8D0-98ED-4B86-9D5F-E61ADC70144D}" type="datetimeFigureOut">
               <a:rPr lang="en-US" smtClean="0"/>
-              <a:t>13-Jul-25</a:t>
+              <a:t>14-Jul-25</a:t>
             </a:fld>
             <a:endParaRPr lang="en-US"/>
           </a:p>
@@ -1170,7 +1178,7 @@
           <a:p>
             <a:fld id="{82EDB8D0-98ED-4B86-9D5F-E61ADC70144D}" type="datetimeFigureOut">
               <a:rPr lang="en-US" smtClean="0"/>
-              <a:t>13-Jul-25</a:t>
+              <a:t>14-Jul-25</a:t>
             </a:fld>
             <a:endParaRPr lang="en-US"/>
           </a:p>
@@ -1657,7 +1665,7 @@
           <a:p>
             <a:fld id="{82EDB8D0-98ED-4B86-9D5F-E61ADC70144D}" type="datetimeFigureOut">
               <a:rPr lang="en-US" smtClean="0"/>
-              <a:t>13-Jul-25</a:t>
+              <a:t>14-Jul-25</a:t>
             </a:fld>
             <a:endParaRPr lang="en-US" dirty="0"/>
           </a:p>
@@ -2426,7 +2434,7 @@
           <a:p>
             <a:fld id="{82EDB8D0-98ED-4B86-9D5F-E61ADC70144D}" type="datetimeFigureOut">
               <a:rPr lang="en-US" smtClean="0"/>
-              <a:t>13-Jul-25</a:t>
+              <a:t>14-Jul-25</a:t>
             </a:fld>
             <a:endParaRPr lang="en-US"/>
           </a:p>
@@ -2908,7 +2916,7 @@
           <a:p>
             <a:fld id="{82EDB8D0-98ED-4B86-9D5F-E61ADC70144D}" type="datetimeFigureOut">
               <a:rPr lang="en-US" smtClean="0"/>
-              <a:t>13-Jul-25</a:t>
+              <a:t>14-Jul-25</a:t>
             </a:fld>
             <a:endParaRPr lang="en-US"/>
           </a:p>
@@ -3604,7 +3612,7 @@
           <a:p>
             <a:fld id="{82EDB8D0-98ED-4B86-9D5F-E61ADC70144D}" type="datetimeFigureOut">
               <a:rPr lang="en-US" smtClean="0"/>
-              <a:t>13-Jul-25</a:t>
+              <a:t>14-Jul-25</a:t>
             </a:fld>
             <a:endParaRPr lang="en-US"/>
           </a:p>
@@ -4029,7 +4037,7 @@
           <a:p>
             <a:fld id="{82EDB8D0-98ED-4B86-9D5F-E61ADC70144D}" type="datetimeFigureOut">
               <a:rPr lang="en-US" smtClean="0"/>
-              <a:t>13-Jul-25</a:t>
+              <a:t>14-Jul-25</a:t>
             </a:fld>
             <a:endParaRPr lang="en-US"/>
           </a:p>
@@ -4426,7 +4434,7 @@
           <a:p>
             <a:fld id="{82EDB8D0-98ED-4B86-9D5F-E61ADC70144D}" type="datetimeFigureOut">
               <a:rPr lang="en-US" smtClean="0"/>
-              <a:t>13-Jul-25</a:t>
+              <a:t>14-Jul-25</a:t>
             </a:fld>
             <a:endParaRPr lang="en-US"/>
           </a:p>
@@ -5021,7 +5029,7 @@
           <a:p>
             <a:fld id="{82EDB8D0-98ED-4B86-9D5F-E61ADC70144D}" type="datetimeFigureOut">
               <a:rPr lang="en-US" smtClean="0"/>
-              <a:t>13-Jul-25</a:t>
+              <a:t>14-Jul-25</a:t>
             </a:fld>
             <a:endParaRPr lang="en-US"/>
           </a:p>
@@ -5596,7 +5604,7 @@
           <a:p>
             <a:fld id="{82EDB8D0-98ED-4B86-9D5F-E61ADC70144D}" type="datetimeFigureOut">
               <a:rPr lang="en-US" smtClean="0"/>
-              <a:t>13-Jul-25</a:t>
+              <a:t>14-Jul-25</a:t>
             </a:fld>
             <a:endParaRPr lang="en-US"/>
           </a:p>
@@ -6123,7 +6131,7 @@
             <a:fld id="{82EDB8D0-98ED-4B86-9D5F-E61ADC70144D}" type="datetimeFigureOut">
               <a:rPr lang="en-US" smtClean="0"/>
               <a:pPr/>
-              <a:t>13-Jul-25</a:t>
+              <a:t>14-Jul-25</a:t>
             </a:fld>
             <a:endParaRPr lang="en-US" dirty="0"/>
           </a:p>
@@ -7040,6 +7048,557 @@
 </p:sld>
 </file>
 
+<file path=ppt/slides/slide10.xml><?xml version="1.0" encoding="utf-8"?>
+<p:sld xmlns:a="http://schemas.openxmlformats.org/drawingml/2006/main" xmlns:r="http://schemas.openxmlformats.org/officeDocument/2006/relationships" xmlns:p="http://schemas.openxmlformats.org/presentationml/2006/main">
+  <p:cSld>
+    <p:spTree>
+      <p:nvGrpSpPr>
+        <p:cNvPr id="1" name=""/>
+        <p:cNvGrpSpPr/>
+        <p:nvPr/>
+      </p:nvGrpSpPr>
+      <p:grpSpPr>
+        <a:xfrm>
+          <a:off x="0" y="0"/>
+          <a:ext cx="0" cy="0"/>
+          <a:chOff x="0" y="0"/>
+          <a:chExt cx="0" cy="0"/>
+        </a:xfrm>
+      </p:grpSpPr>
+      <p:sp>
+        <p:nvSpPr>
+          <p:cNvPr id="2" name="Title 1">
+            <a:extLst>
+              <a:ext uri="{FF2B5EF4-FFF2-40B4-BE49-F238E27FC236}">
+                <a16:creationId xmlns:a16="http://schemas.microsoft.com/office/drawing/2014/main" id="{EBCBA0F0-48FA-C55F-D5BD-D512670805AE}"/>
+              </a:ext>
+            </a:extLst>
+          </p:cNvPr>
+          <p:cNvSpPr>
+            <a:spLocks noGrp="1"/>
+          </p:cNvSpPr>
+          <p:nvPr>
+            <p:ph type="title"/>
+          </p:nvPr>
+        </p:nvSpPr>
+        <p:spPr/>
+        <p:txBody>
+          <a:bodyPr/>
+          <a:lstStyle/>
+          <a:p>
+            <a:r>
+              <a:rPr lang="en-US" dirty="0"/>
+              <a:t>The Law of Demeter – Hiding Structure</a:t>
+            </a:r>
+          </a:p>
+        </p:txBody>
+      </p:sp>
+      <p:sp>
+        <p:nvSpPr>
+          <p:cNvPr id="3" name="Content Placeholder 2">
+            <a:extLst>
+              <a:ext uri="{FF2B5EF4-FFF2-40B4-BE49-F238E27FC236}">
+                <a16:creationId xmlns:a16="http://schemas.microsoft.com/office/drawing/2014/main" id="{DC66D169-F52B-90F7-9A58-AD42B23A7EA9}"/>
+              </a:ext>
+            </a:extLst>
+          </p:cNvPr>
+          <p:cNvSpPr>
+            <a:spLocks noGrp="1"/>
+          </p:cNvSpPr>
+          <p:nvPr>
+            <p:ph idx="1"/>
+          </p:nvPr>
+        </p:nvSpPr>
+        <p:spPr/>
+        <p:txBody>
+          <a:bodyPr/>
+          <a:lstStyle/>
+          <a:p>
+            <a:r>
+              <a:rPr lang="en-US" dirty="0"/>
+              <a:t>If </a:t>
+            </a:r>
+            <a:r>
+              <a:rPr lang="en-US" i="1" dirty="0" err="1"/>
+              <a:t>ctxt</a:t>
+            </a:r>
+            <a:r>
+              <a:rPr lang="en-US" dirty="0"/>
+              <a:t> is an object, we should be telling it to </a:t>
+            </a:r>
+            <a:r>
+              <a:rPr lang="en-US" i="1" dirty="0"/>
+              <a:t>do something</a:t>
+            </a:r>
+            <a:r>
+              <a:rPr lang="en-US" dirty="0"/>
+              <a:t>; we should not be asking it about its internals.</a:t>
+            </a:r>
+          </a:p>
+          <a:p>
+            <a:pPr marL="514350" indent="-514350">
+              <a:buFont typeface="+mj-lt"/>
+              <a:buAutoNum type="arabicPeriod"/>
+            </a:pPr>
+            <a:r>
+              <a:rPr lang="en-US" i="1" dirty="0" err="1"/>
+              <a:t>ctxt.getAbsoultePathOfScratchDirectoryOption</a:t>
+            </a:r>
+            <a:r>
+              <a:rPr lang="en-US" i="1" dirty="0"/>
+              <a:t>()</a:t>
+            </a:r>
+            <a:r>
+              <a:rPr lang="en-US" dirty="0"/>
+              <a:t> =&gt; this leads to method explosion as </a:t>
+            </a:r>
+            <a:r>
+              <a:rPr lang="en-US" i="1" dirty="0" err="1"/>
+              <a:t>ctxt</a:t>
+            </a:r>
+            <a:r>
+              <a:rPr lang="en-US" dirty="0"/>
+              <a:t> would need countless specific getter methods.</a:t>
+            </a:r>
+          </a:p>
+          <a:p>
+            <a:pPr marL="514350" indent="-514350">
+              <a:buFont typeface="+mj-lt"/>
+              <a:buAutoNum type="arabicPeriod"/>
+            </a:pPr>
+            <a:r>
+              <a:rPr lang="en-US" i="1" dirty="0" err="1"/>
+              <a:t>ctx.getScratchDirectoryOption</a:t>
+            </a:r>
+            <a:r>
+              <a:rPr lang="en-US" i="1" dirty="0"/>
+              <a:t>().</a:t>
+            </a:r>
+            <a:r>
+              <a:rPr lang="en-US" i="1" dirty="0" err="1"/>
+              <a:t>getAbsolutePath</a:t>
+            </a:r>
+            <a:r>
+              <a:rPr lang="en-US" i="1" dirty="0"/>
+              <a:t>()</a:t>
+            </a:r>
+            <a:r>
+              <a:rPr lang="en-US" dirty="0"/>
+              <a:t> =&gt; this assumes the returned object is a data structure, not a true object. </a:t>
+            </a:r>
+          </a:p>
+        </p:txBody>
+      </p:sp>
+    </p:spTree>
+    <p:extLst>
+      <p:ext uri="{BB962C8B-B14F-4D97-AF65-F5344CB8AC3E}">
+        <p14:creationId xmlns:p14="http://schemas.microsoft.com/office/powerpoint/2010/main" val="1354243129"/>
+      </p:ext>
+    </p:extLst>
+  </p:cSld>
+  <p:clrMapOvr>
+    <a:masterClrMapping/>
+  </p:clrMapOvr>
+</p:sld>
+</file>
+
+<file path=ppt/slides/slide11.xml><?xml version="1.0" encoding="utf-8"?>
+<p:sld xmlns:a="http://schemas.openxmlformats.org/drawingml/2006/main" xmlns:r="http://schemas.openxmlformats.org/officeDocument/2006/relationships" xmlns:p="http://schemas.openxmlformats.org/presentationml/2006/main">
+  <p:cSld>
+    <p:spTree>
+      <p:nvGrpSpPr>
+        <p:cNvPr id="1" name=""/>
+        <p:cNvGrpSpPr/>
+        <p:nvPr/>
+      </p:nvGrpSpPr>
+      <p:grpSpPr>
+        <a:xfrm>
+          <a:off x="0" y="0"/>
+          <a:ext cx="0" cy="0"/>
+          <a:chOff x="0" y="0"/>
+          <a:chExt cx="0" cy="0"/>
+        </a:xfrm>
+      </p:grpSpPr>
+      <p:sp>
+        <p:nvSpPr>
+          <p:cNvPr id="2" name="Title 1">
+            <a:extLst>
+              <a:ext uri="{FF2B5EF4-FFF2-40B4-BE49-F238E27FC236}">
+                <a16:creationId xmlns:a16="http://schemas.microsoft.com/office/drawing/2014/main" id="{8C2A67DD-7106-C107-2E80-CFDA8165A1F6}"/>
+              </a:ext>
+            </a:extLst>
+          </p:cNvPr>
+          <p:cNvSpPr>
+            <a:spLocks noGrp="1"/>
+          </p:cNvSpPr>
+          <p:nvPr>
+            <p:ph type="title"/>
+          </p:nvPr>
+        </p:nvSpPr>
+        <p:spPr/>
+        <p:txBody>
+          <a:bodyPr/>
+          <a:lstStyle/>
+          <a:p>
+            <a:r>
+              <a:rPr lang="en-US" dirty="0"/>
+              <a:t>The Law of Demeter – Hiding Structure (cont.)</a:t>
+            </a:r>
+          </a:p>
+        </p:txBody>
+      </p:sp>
+      <p:sp>
+        <p:nvSpPr>
+          <p:cNvPr id="3" name="Content Placeholder 2">
+            <a:extLst>
+              <a:ext uri="{FF2B5EF4-FFF2-40B4-BE49-F238E27FC236}">
+                <a16:creationId xmlns:a16="http://schemas.microsoft.com/office/drawing/2014/main" id="{8DF6E53F-7C29-6FE3-5F28-B76237A5955D}"/>
+              </a:ext>
+            </a:extLst>
+          </p:cNvPr>
+          <p:cNvSpPr>
+            <a:spLocks noGrp="1"/>
+          </p:cNvSpPr>
+          <p:nvPr>
+            <p:ph idx="1"/>
+          </p:nvPr>
+        </p:nvSpPr>
+        <p:spPr/>
+        <p:txBody>
+          <a:bodyPr/>
+          <a:lstStyle/>
+          <a:p>
+            <a:endParaRPr lang="en-US" i="1" dirty="0"/>
+          </a:p>
+          <a:p>
+            <a:r>
+              <a:rPr lang="en-US" i="1" dirty="0" err="1"/>
+              <a:t>BufferedOutputStream</a:t>
+            </a:r>
+            <a:r>
+              <a:rPr lang="en-US" i="1" dirty="0"/>
+              <a:t> </a:t>
+            </a:r>
+            <a:r>
+              <a:rPr lang="en-US" i="1" dirty="0" err="1"/>
+              <a:t>bos</a:t>
+            </a:r>
+            <a:r>
+              <a:rPr lang="en-US" i="1" dirty="0"/>
+              <a:t> = </a:t>
+            </a:r>
+            <a:r>
+              <a:rPr lang="en-US" i="1" dirty="0" err="1"/>
+              <a:t>ctxt.createScratchFileSystem</a:t>
+            </a:r>
+            <a:r>
+              <a:rPr lang="en-US" i="1" dirty="0"/>
+              <a:t>(</a:t>
+            </a:r>
+            <a:r>
+              <a:rPr lang="en-US" i="1" dirty="0" err="1"/>
+              <a:t>classFileName</a:t>
+            </a:r>
+            <a:r>
+              <a:rPr lang="en-US" i="1" dirty="0"/>
+              <a:t>);</a:t>
+            </a:r>
+          </a:p>
+          <a:p>
+            <a:pPr lvl="1"/>
+            <a:endParaRPr lang="en-US" dirty="0"/>
+          </a:p>
+          <a:p>
+            <a:pPr lvl="1"/>
+            <a:r>
+              <a:rPr lang="en-US" dirty="0"/>
+              <a:t>This seems like a reasonable thing for an object to do.</a:t>
+            </a:r>
+          </a:p>
+          <a:p>
+            <a:pPr lvl="1"/>
+            <a:endParaRPr lang="en-US" dirty="0"/>
+          </a:p>
+          <a:p>
+            <a:pPr lvl="1"/>
+            <a:r>
+              <a:rPr lang="en-US" dirty="0"/>
+              <a:t>This allows </a:t>
+            </a:r>
+            <a:r>
+              <a:rPr lang="en-US" i="1" dirty="0" err="1"/>
+              <a:t>ctxt</a:t>
+            </a:r>
+            <a:r>
+              <a:rPr lang="en-US" dirty="0"/>
+              <a:t> to hide its internals and prevents the current function from having to violate the Low of Demeter by navigating through objects it shouldn’t know about.</a:t>
+            </a:r>
+          </a:p>
+        </p:txBody>
+      </p:sp>
+    </p:spTree>
+    <p:extLst>
+      <p:ext uri="{BB962C8B-B14F-4D97-AF65-F5344CB8AC3E}">
+        <p14:creationId xmlns:p14="http://schemas.microsoft.com/office/powerpoint/2010/main" val="2008657422"/>
+      </p:ext>
+    </p:extLst>
+  </p:cSld>
+  <p:clrMapOvr>
+    <a:masterClrMapping/>
+  </p:clrMapOvr>
+</p:sld>
+</file>
+
+<file path=ppt/slides/slide12.xml><?xml version="1.0" encoding="utf-8"?>
+<p:sld xmlns:a="http://schemas.openxmlformats.org/drawingml/2006/main" xmlns:r="http://schemas.openxmlformats.org/officeDocument/2006/relationships" xmlns:p="http://schemas.openxmlformats.org/presentationml/2006/main">
+  <p:cSld>
+    <p:spTree>
+      <p:nvGrpSpPr>
+        <p:cNvPr id="1" name=""/>
+        <p:cNvGrpSpPr/>
+        <p:nvPr/>
+      </p:nvGrpSpPr>
+      <p:grpSpPr>
+        <a:xfrm>
+          <a:off x="0" y="0"/>
+          <a:ext cx="0" cy="0"/>
+          <a:chOff x="0" y="0"/>
+          <a:chExt cx="0" cy="0"/>
+        </a:xfrm>
+      </p:grpSpPr>
+      <p:sp>
+        <p:nvSpPr>
+          <p:cNvPr id="2" name="Title 1">
+            <a:extLst>
+              <a:ext uri="{FF2B5EF4-FFF2-40B4-BE49-F238E27FC236}">
+                <a16:creationId xmlns:a16="http://schemas.microsoft.com/office/drawing/2014/main" id="{1F5A1F55-5B2F-DC7A-C6B6-F6B22CCD7016}"/>
+              </a:ext>
+            </a:extLst>
+          </p:cNvPr>
+          <p:cNvSpPr>
+            <a:spLocks noGrp="1"/>
+          </p:cNvSpPr>
+          <p:nvPr>
+            <p:ph type="title"/>
+          </p:nvPr>
+        </p:nvSpPr>
+        <p:spPr/>
+        <p:txBody>
+          <a:bodyPr/>
+          <a:lstStyle/>
+          <a:p>
+            <a:r>
+              <a:rPr lang="en-US" dirty="0"/>
+              <a:t>Data Transfer Objects</a:t>
+            </a:r>
+          </a:p>
+        </p:txBody>
+      </p:sp>
+      <p:sp>
+        <p:nvSpPr>
+          <p:cNvPr id="3" name="Content Placeholder 2">
+            <a:extLst>
+              <a:ext uri="{FF2B5EF4-FFF2-40B4-BE49-F238E27FC236}">
+                <a16:creationId xmlns:a16="http://schemas.microsoft.com/office/drawing/2014/main" id="{0DE33687-53F1-2BCF-3B86-90061AA635A3}"/>
+              </a:ext>
+            </a:extLst>
+          </p:cNvPr>
+          <p:cNvSpPr>
+            <a:spLocks noGrp="1"/>
+          </p:cNvSpPr>
+          <p:nvPr>
+            <p:ph idx="1"/>
+          </p:nvPr>
+        </p:nvSpPr>
+        <p:spPr/>
+        <p:txBody>
+          <a:bodyPr/>
+          <a:lstStyle/>
+          <a:p>
+            <a:r>
+              <a:rPr lang="en-US" dirty="0"/>
+              <a:t>The quintessential form of a data structure is a class with public variables and no functions.</a:t>
+            </a:r>
+          </a:p>
+          <a:p>
+            <a:pPr lvl="1"/>
+            <a:r>
+              <a:rPr lang="en-US" dirty="0"/>
+              <a:t>This is sometimes called a data transfer object, or </a:t>
+            </a:r>
+            <a:r>
+              <a:rPr lang="en-US" b="1" dirty="0"/>
+              <a:t>DTO</a:t>
+            </a:r>
+            <a:r>
+              <a:rPr lang="en-US" dirty="0"/>
+              <a:t>.</a:t>
+            </a:r>
+          </a:p>
+          <a:p>
+            <a:r>
+              <a:rPr lang="en-US" dirty="0"/>
+              <a:t>DTOs are very useful structures, especially when communicating with database or parsing messages from sockets, and so on.</a:t>
+            </a:r>
+          </a:p>
+          <a:p>
+            <a:pPr lvl="1"/>
+            <a:r>
+              <a:rPr lang="en-US" dirty="0"/>
+              <a:t>They often become the first in a series of translation stages that convert raw data in a database into objects in the application code.</a:t>
+            </a:r>
+          </a:p>
+        </p:txBody>
+      </p:sp>
+    </p:spTree>
+    <p:extLst>
+      <p:ext uri="{BB962C8B-B14F-4D97-AF65-F5344CB8AC3E}">
+        <p14:creationId xmlns:p14="http://schemas.microsoft.com/office/powerpoint/2010/main" val="2790878714"/>
+      </p:ext>
+    </p:extLst>
+  </p:cSld>
+  <p:clrMapOvr>
+    <a:masterClrMapping/>
+  </p:clrMapOvr>
+</p:sld>
+</file>
+
+<file path=ppt/slides/slide13.xml><?xml version="1.0" encoding="utf-8"?>
+<p:sld xmlns:a="http://schemas.openxmlformats.org/drawingml/2006/main" xmlns:r="http://schemas.openxmlformats.org/officeDocument/2006/relationships" xmlns:p="http://schemas.openxmlformats.org/presentationml/2006/main">
+  <p:cSld>
+    <p:spTree>
+      <p:nvGrpSpPr>
+        <p:cNvPr id="1" name=""/>
+        <p:cNvGrpSpPr/>
+        <p:nvPr/>
+      </p:nvGrpSpPr>
+      <p:grpSpPr>
+        <a:xfrm>
+          <a:off x="0" y="0"/>
+          <a:ext cx="0" cy="0"/>
+          <a:chOff x="0" y="0"/>
+          <a:chExt cx="0" cy="0"/>
+        </a:xfrm>
+      </p:grpSpPr>
+      <p:sp>
+        <p:nvSpPr>
+          <p:cNvPr id="2" name="Title 1">
+            <a:extLst>
+              <a:ext uri="{FF2B5EF4-FFF2-40B4-BE49-F238E27FC236}">
+                <a16:creationId xmlns:a16="http://schemas.microsoft.com/office/drawing/2014/main" id="{5230EB49-FD96-4C41-A8F4-F747E907CDF0}"/>
+              </a:ext>
+            </a:extLst>
+          </p:cNvPr>
+          <p:cNvSpPr>
+            <a:spLocks noGrp="1"/>
+          </p:cNvSpPr>
+          <p:nvPr>
+            <p:ph type="title"/>
+          </p:nvPr>
+        </p:nvSpPr>
+        <p:spPr/>
+        <p:txBody>
+          <a:bodyPr/>
+          <a:lstStyle/>
+          <a:p>
+            <a:r>
+              <a:rPr lang="en-US" dirty="0"/>
+              <a:t>Data Transfer Objects – Active Record</a:t>
+            </a:r>
+          </a:p>
+        </p:txBody>
+      </p:sp>
+      <p:sp>
+        <p:nvSpPr>
+          <p:cNvPr id="3" name="Content Placeholder 2">
+            <a:extLst>
+              <a:ext uri="{FF2B5EF4-FFF2-40B4-BE49-F238E27FC236}">
+                <a16:creationId xmlns:a16="http://schemas.microsoft.com/office/drawing/2014/main" id="{B9166AE5-C8FA-147A-AB7A-2FB8E13091A7}"/>
+              </a:ext>
+            </a:extLst>
+          </p:cNvPr>
+          <p:cNvSpPr>
+            <a:spLocks noGrp="1"/>
+          </p:cNvSpPr>
+          <p:nvPr>
+            <p:ph idx="1"/>
+          </p:nvPr>
+        </p:nvSpPr>
+        <p:spPr/>
+        <p:txBody>
+          <a:bodyPr>
+            <a:normAutofit fontScale="92500"/>
+          </a:bodyPr>
+          <a:lstStyle/>
+          <a:p>
+            <a:r>
+              <a:rPr lang="en-US" dirty="0"/>
+              <a:t>Active records are special forms of DTOs.</a:t>
+            </a:r>
+          </a:p>
+          <a:p>
+            <a:r>
+              <a:rPr lang="en-US" dirty="0"/>
+              <a:t>They are data structures with public (or bean-accessed) variables.</a:t>
+            </a:r>
+          </a:p>
+          <a:p>
+            <a:pPr lvl="1"/>
+            <a:r>
+              <a:rPr lang="en-US" dirty="0"/>
+              <a:t>They have navigational methods like </a:t>
+            </a:r>
+            <a:r>
+              <a:rPr lang="en-US" sz="2000" dirty="0"/>
+              <a:t>save</a:t>
+            </a:r>
+            <a:r>
+              <a:rPr lang="en-US" dirty="0"/>
+              <a:t> and </a:t>
+            </a:r>
+            <a:r>
+              <a:rPr lang="en-US" sz="2000" dirty="0"/>
+              <a:t>find</a:t>
+            </a:r>
+            <a:r>
+              <a:rPr lang="en-US" dirty="0"/>
+              <a:t>.</a:t>
+            </a:r>
+          </a:p>
+          <a:p>
+            <a:pPr lvl="1"/>
+            <a:r>
+              <a:rPr lang="en-US" dirty="0"/>
+              <a:t>They are direct translation from database tables, or other data sources.</a:t>
+            </a:r>
+          </a:p>
+          <a:p>
+            <a:r>
+              <a:rPr lang="en-US" dirty="0"/>
+              <a:t>Treat Active Records as a data structure.</a:t>
+            </a:r>
+          </a:p>
+          <a:p>
+            <a:r>
+              <a:rPr lang="en-US" dirty="0"/>
+              <a:t>Create separate objects that contain the business rules and that hide their internal data (which are probably just instances of the Active Record).</a:t>
+            </a:r>
+          </a:p>
+        </p:txBody>
+      </p:sp>
+    </p:spTree>
+    <p:extLst>
+      <p:ext uri="{BB962C8B-B14F-4D97-AF65-F5344CB8AC3E}">
+        <p14:creationId xmlns:p14="http://schemas.microsoft.com/office/powerpoint/2010/main" val="968595422"/>
+      </p:ext>
+    </p:extLst>
+  </p:cSld>
+  <p:clrMapOvr>
+    <a:masterClrMapping/>
+  </p:clrMapOvr>
+</p:sld>
+</file>
+
 <file path=ppt/slides/slide2.xml><?xml version="1.0" encoding="utf-8"?>
 <p:sld xmlns:a="http://schemas.openxmlformats.org/drawingml/2006/main" xmlns:r="http://schemas.openxmlformats.org/officeDocument/2006/relationships" xmlns:p="http://schemas.openxmlformats.org/presentationml/2006/main">
   <p:cSld>
@@ -8011,6 +8570,508 @@
     <p:extLst>
       <p:ext uri="{BB962C8B-B14F-4D97-AF65-F5344CB8AC3E}">
         <p14:creationId xmlns:p14="http://schemas.microsoft.com/office/powerpoint/2010/main" val="1370715176"/>
+      </p:ext>
+    </p:extLst>
+  </p:cSld>
+  <p:clrMapOvr>
+    <a:masterClrMapping/>
+  </p:clrMapOvr>
+</p:sld>
+</file>
+
+<file path=ppt/slides/slide6.xml><?xml version="1.0" encoding="utf-8"?>
+<p:sld xmlns:a="http://schemas.openxmlformats.org/drawingml/2006/main" xmlns:r="http://schemas.openxmlformats.org/officeDocument/2006/relationships" xmlns:p="http://schemas.openxmlformats.org/presentationml/2006/main">
+  <p:cSld>
+    <p:spTree>
+      <p:nvGrpSpPr>
+        <p:cNvPr id="1" name=""/>
+        <p:cNvGrpSpPr/>
+        <p:nvPr/>
+      </p:nvGrpSpPr>
+      <p:grpSpPr>
+        <a:xfrm>
+          <a:off x="0" y="0"/>
+          <a:ext cx="0" cy="0"/>
+          <a:chOff x="0" y="0"/>
+          <a:chExt cx="0" cy="0"/>
+        </a:xfrm>
+      </p:grpSpPr>
+      <p:sp>
+        <p:nvSpPr>
+          <p:cNvPr id="2" name="Title 1">
+            <a:extLst>
+              <a:ext uri="{FF2B5EF4-FFF2-40B4-BE49-F238E27FC236}">
+                <a16:creationId xmlns:a16="http://schemas.microsoft.com/office/drawing/2014/main" id="{D7FD4838-18BE-F740-874A-0C07E8C34B76}"/>
+              </a:ext>
+            </a:extLst>
+          </p:cNvPr>
+          <p:cNvSpPr>
+            <a:spLocks noGrp="1"/>
+          </p:cNvSpPr>
+          <p:nvPr>
+            <p:ph type="title"/>
+          </p:nvPr>
+        </p:nvSpPr>
+        <p:spPr/>
+        <p:txBody>
+          <a:bodyPr/>
+          <a:lstStyle/>
+          <a:p>
+            <a:r>
+              <a:rPr lang="en-US" dirty="0"/>
+              <a:t>The Law of Demeter</a:t>
+            </a:r>
+          </a:p>
+        </p:txBody>
+      </p:sp>
+      <p:sp>
+        <p:nvSpPr>
+          <p:cNvPr id="3" name="Content Placeholder 2">
+            <a:extLst>
+              <a:ext uri="{FF2B5EF4-FFF2-40B4-BE49-F238E27FC236}">
+                <a16:creationId xmlns:a16="http://schemas.microsoft.com/office/drawing/2014/main" id="{5B9C9791-F748-F95E-0D2C-E36825F3C1D4}"/>
+              </a:ext>
+            </a:extLst>
+          </p:cNvPr>
+          <p:cNvSpPr>
+            <a:spLocks noGrp="1"/>
+          </p:cNvSpPr>
+          <p:nvPr>
+            <p:ph idx="1"/>
+          </p:nvPr>
+        </p:nvSpPr>
+        <p:spPr/>
+        <p:txBody>
+          <a:bodyPr>
+            <a:normAutofit lnSpcReduction="10000"/>
+          </a:bodyPr>
+          <a:lstStyle/>
+          <a:p>
+            <a:r>
+              <a:rPr lang="en-US" dirty="0"/>
+              <a:t>Object shouldn’t expose its internal structure through accessors because to do so is to expose, rather than to hide, its internal structure.</a:t>
+            </a:r>
+          </a:p>
+          <a:p>
+            <a:r>
+              <a:rPr lang="en-US" dirty="0"/>
+              <a:t>The low of Demeter says that a method </a:t>
+            </a:r>
+            <a:r>
+              <a:rPr lang="en-US" i="1" dirty="0"/>
+              <a:t>f</a:t>
+            </a:r>
+            <a:r>
+              <a:rPr lang="en-US" dirty="0"/>
+              <a:t> of a class </a:t>
+            </a:r>
+            <a:r>
+              <a:rPr lang="en-US" i="1" dirty="0"/>
+              <a:t>C</a:t>
+            </a:r>
+            <a:r>
+              <a:rPr lang="en-US" dirty="0"/>
+              <a:t> should only call the methods of these:</a:t>
+            </a:r>
+          </a:p>
+          <a:p>
+            <a:pPr lvl="1"/>
+            <a:r>
+              <a:rPr lang="en-US" dirty="0"/>
+              <a:t>C.                                                       - An object created by </a:t>
+            </a:r>
+            <a:r>
+              <a:rPr lang="en-US" i="1" dirty="0"/>
+              <a:t>f</a:t>
+            </a:r>
+            <a:r>
+              <a:rPr lang="en-US" dirty="0"/>
+              <a:t>. </a:t>
+            </a:r>
+          </a:p>
+          <a:p>
+            <a:pPr lvl="1"/>
+            <a:r>
+              <a:rPr lang="en-US" dirty="0"/>
+              <a:t>An object passed as an argument to </a:t>
+            </a:r>
+            <a:r>
+              <a:rPr lang="en-US" i="1" dirty="0"/>
+              <a:t>f.</a:t>
+            </a:r>
+          </a:p>
+          <a:p>
+            <a:pPr lvl="1"/>
+            <a:r>
+              <a:rPr lang="en-US" dirty="0"/>
+              <a:t>An object held in an instance variable of </a:t>
+            </a:r>
+            <a:r>
+              <a:rPr lang="en-US" i="1" dirty="0"/>
+              <a:t>C</a:t>
+            </a:r>
+            <a:r>
+              <a:rPr lang="en-US" dirty="0"/>
+              <a:t>.</a:t>
+            </a:r>
+          </a:p>
+          <a:p>
+            <a:r>
+              <a:rPr lang="en-US" dirty="0"/>
+              <a:t>The method shouldn’t invoke methods on objects that are returned by any of the allowed functions.</a:t>
+            </a:r>
+          </a:p>
+        </p:txBody>
+      </p:sp>
+    </p:spTree>
+    <p:extLst>
+      <p:ext uri="{BB962C8B-B14F-4D97-AF65-F5344CB8AC3E}">
+        <p14:creationId xmlns:p14="http://schemas.microsoft.com/office/powerpoint/2010/main" val="2748268283"/>
+      </p:ext>
+    </p:extLst>
+  </p:cSld>
+  <p:clrMapOvr>
+    <a:masterClrMapping/>
+  </p:clrMapOvr>
+</p:sld>
+</file>
+
+<file path=ppt/slides/slide7.xml><?xml version="1.0" encoding="utf-8"?>
+<p:sld xmlns:a="http://schemas.openxmlformats.org/drawingml/2006/main" xmlns:r="http://schemas.openxmlformats.org/officeDocument/2006/relationships" xmlns:p="http://schemas.openxmlformats.org/presentationml/2006/main">
+  <p:cSld>
+    <p:spTree>
+      <p:nvGrpSpPr>
+        <p:cNvPr id="1" name=""/>
+        <p:cNvGrpSpPr/>
+        <p:nvPr/>
+      </p:nvGrpSpPr>
+      <p:grpSpPr>
+        <a:xfrm>
+          <a:off x="0" y="0"/>
+          <a:ext cx="0" cy="0"/>
+          <a:chOff x="0" y="0"/>
+          <a:chExt cx="0" cy="0"/>
+        </a:xfrm>
+      </p:grpSpPr>
+      <p:sp>
+        <p:nvSpPr>
+          <p:cNvPr id="2" name="Title 1">
+            <a:extLst>
+              <a:ext uri="{FF2B5EF4-FFF2-40B4-BE49-F238E27FC236}">
+                <a16:creationId xmlns:a16="http://schemas.microsoft.com/office/drawing/2014/main" id="{02902A5E-C801-D484-38D2-1F34A1465FEA}"/>
+              </a:ext>
+            </a:extLst>
+          </p:cNvPr>
+          <p:cNvSpPr>
+            <a:spLocks noGrp="1"/>
+          </p:cNvSpPr>
+          <p:nvPr>
+            <p:ph type="title"/>
+          </p:nvPr>
+        </p:nvSpPr>
+        <p:spPr/>
+        <p:txBody>
+          <a:bodyPr/>
+          <a:lstStyle/>
+          <a:p>
+            <a:r>
+              <a:rPr lang="en-US" dirty="0"/>
+              <a:t>The Law of Demeter – Train Wrecks</a:t>
+            </a:r>
+          </a:p>
+        </p:txBody>
+      </p:sp>
+      <p:sp>
+        <p:nvSpPr>
+          <p:cNvPr id="3" name="Content Placeholder 2">
+            <a:extLst>
+              <a:ext uri="{FF2B5EF4-FFF2-40B4-BE49-F238E27FC236}">
+                <a16:creationId xmlns:a16="http://schemas.microsoft.com/office/drawing/2014/main" id="{36D80118-D088-36A5-24E7-FA5C38915B49}"/>
+              </a:ext>
+            </a:extLst>
+          </p:cNvPr>
+          <p:cNvSpPr>
+            <a:spLocks noGrp="1"/>
+          </p:cNvSpPr>
+          <p:nvPr>
+            <p:ph idx="1"/>
+          </p:nvPr>
+        </p:nvSpPr>
+        <p:spPr/>
+        <p:txBody>
+          <a:bodyPr/>
+          <a:lstStyle/>
+          <a:p>
+            <a:r>
+              <a:rPr lang="en-US" dirty="0"/>
+              <a:t>Chains of calls are generally considered to be sloppy style and should be avoided.</a:t>
+            </a:r>
+          </a:p>
+          <a:p>
+            <a:endParaRPr lang="en-US" dirty="0"/>
+          </a:p>
+          <a:p>
+            <a:r>
+              <a:rPr lang="en-US" dirty="0"/>
+              <a:t>If the </a:t>
+            </a:r>
+            <a:r>
+              <a:rPr lang="en-US" i="1" dirty="0" err="1"/>
+              <a:t>ctxt</a:t>
+            </a:r>
+            <a:r>
+              <a:rPr lang="en-US" dirty="0"/>
+              <a:t>, </a:t>
+            </a:r>
+            <a:r>
+              <a:rPr lang="en-US" i="1" dirty="0"/>
+              <a:t>options</a:t>
+            </a:r>
+            <a:r>
+              <a:rPr lang="en-US" dirty="0"/>
+              <a:t>, and </a:t>
+            </a:r>
+            <a:r>
+              <a:rPr lang="en-US" i="1" dirty="0" err="1"/>
+              <a:t>ScratchDir</a:t>
+            </a:r>
+            <a:r>
+              <a:rPr lang="en-US" dirty="0"/>
+              <a:t> are true objects, then the chaining violates Demeter because the calling code knows two much about the internal structure of multiple objects.</a:t>
+            </a:r>
+          </a:p>
+          <a:p>
+            <a:r>
+              <a:rPr lang="en-US" dirty="0"/>
+              <a:t>If they’re just data structures, then exposing their internal structure is natural and Demeter doesn’t apply.</a:t>
+            </a:r>
+          </a:p>
+        </p:txBody>
+      </p:sp>
+      <p:pic>
+        <p:nvPicPr>
+          <p:cNvPr id="5" name="Picture 4">
+            <a:extLst>
+              <a:ext uri="{FF2B5EF4-FFF2-40B4-BE49-F238E27FC236}">
+                <a16:creationId xmlns:a16="http://schemas.microsoft.com/office/drawing/2014/main" id="{765891A9-3AC7-D3F8-7E27-EFB966FC6DB6}"/>
+              </a:ext>
+            </a:extLst>
+          </p:cNvPr>
+          <p:cNvPicPr>
+            <a:picLocks noChangeAspect="1"/>
+          </p:cNvPicPr>
+          <p:nvPr/>
+        </p:nvPicPr>
+        <p:blipFill>
+          <a:blip r:embed="rId2"/>
+          <a:stretch>
+            <a:fillRect/>
+          </a:stretch>
+        </p:blipFill>
+        <p:spPr>
+          <a:xfrm>
+            <a:off x="4429839" y="2462636"/>
+            <a:ext cx="4359018" cy="617273"/>
+          </a:xfrm>
+          <a:prstGeom prst="rect">
+            <a:avLst/>
+          </a:prstGeom>
+        </p:spPr>
+      </p:pic>
+    </p:spTree>
+    <p:extLst>
+      <p:ext uri="{BB962C8B-B14F-4D97-AF65-F5344CB8AC3E}">
+        <p14:creationId xmlns:p14="http://schemas.microsoft.com/office/powerpoint/2010/main" val="1304868014"/>
+      </p:ext>
+    </p:extLst>
+  </p:cSld>
+  <p:clrMapOvr>
+    <a:masterClrMapping/>
+  </p:clrMapOvr>
+</p:sld>
+</file>
+
+<file path=ppt/slides/slide8.xml><?xml version="1.0" encoding="utf-8"?>
+<p:sld xmlns:a="http://schemas.openxmlformats.org/drawingml/2006/main" xmlns:r="http://schemas.openxmlformats.org/officeDocument/2006/relationships" xmlns:p="http://schemas.openxmlformats.org/presentationml/2006/main">
+  <p:cSld>
+    <p:spTree>
+      <p:nvGrpSpPr>
+        <p:cNvPr id="1" name=""/>
+        <p:cNvGrpSpPr/>
+        <p:nvPr/>
+      </p:nvGrpSpPr>
+      <p:grpSpPr>
+        <a:xfrm>
+          <a:off x="0" y="0"/>
+          <a:ext cx="0" cy="0"/>
+          <a:chOff x="0" y="0"/>
+          <a:chExt cx="0" cy="0"/>
+        </a:xfrm>
+      </p:grpSpPr>
+      <p:sp>
+        <p:nvSpPr>
+          <p:cNvPr id="2" name="Title 1">
+            <a:extLst>
+              <a:ext uri="{FF2B5EF4-FFF2-40B4-BE49-F238E27FC236}">
+                <a16:creationId xmlns:a16="http://schemas.microsoft.com/office/drawing/2014/main" id="{7F97A7C4-6377-2E3D-2671-488DCF4E1267}"/>
+              </a:ext>
+            </a:extLst>
+          </p:cNvPr>
+          <p:cNvSpPr>
+            <a:spLocks noGrp="1"/>
+          </p:cNvSpPr>
+          <p:nvPr>
+            <p:ph type="title"/>
+          </p:nvPr>
+        </p:nvSpPr>
+        <p:spPr/>
+        <p:txBody>
+          <a:bodyPr/>
+          <a:lstStyle/>
+          <a:p>
+            <a:r>
+              <a:rPr lang="en-US" dirty="0"/>
+              <a:t>The Law of Demeter – Train Wrecks (cont.)</a:t>
+            </a:r>
+          </a:p>
+        </p:txBody>
+      </p:sp>
+      <p:sp>
+        <p:nvSpPr>
+          <p:cNvPr id="3" name="Content Placeholder 2">
+            <a:extLst>
+              <a:ext uri="{FF2B5EF4-FFF2-40B4-BE49-F238E27FC236}">
+                <a16:creationId xmlns:a16="http://schemas.microsoft.com/office/drawing/2014/main" id="{6B264898-A720-7D44-96DB-56656B5CD6E3}"/>
+              </a:ext>
+            </a:extLst>
+          </p:cNvPr>
+          <p:cNvSpPr>
+            <a:spLocks noGrp="1"/>
+          </p:cNvSpPr>
+          <p:nvPr>
+            <p:ph idx="1"/>
+          </p:nvPr>
+        </p:nvSpPr>
+        <p:spPr/>
+        <p:txBody>
+          <a:bodyPr/>
+          <a:lstStyle/>
+          <a:p>
+            <a:r>
+              <a:rPr lang="en-US" dirty="0"/>
+              <a:t>Accessor methods (getters/setters) blur the previous distinction they make data structures look like objects even when they’re just data containers.</a:t>
+            </a:r>
+          </a:p>
+          <a:p>
+            <a:r>
+              <a:rPr lang="en-US" dirty="0"/>
+              <a:t>Data structures should have public variables and no methods, while objects should have private variables and public methods.</a:t>
+            </a:r>
+          </a:p>
+        </p:txBody>
+      </p:sp>
+    </p:spTree>
+    <p:extLst>
+      <p:ext uri="{BB962C8B-B14F-4D97-AF65-F5344CB8AC3E}">
+        <p14:creationId xmlns:p14="http://schemas.microsoft.com/office/powerpoint/2010/main" val="224354815"/>
+      </p:ext>
+    </p:extLst>
+  </p:cSld>
+  <p:clrMapOvr>
+    <a:masterClrMapping/>
+  </p:clrMapOvr>
+</p:sld>
+</file>
+
+<file path=ppt/slides/slide9.xml><?xml version="1.0" encoding="utf-8"?>
+<p:sld xmlns:a="http://schemas.openxmlformats.org/drawingml/2006/main" xmlns:r="http://schemas.openxmlformats.org/officeDocument/2006/relationships" xmlns:p="http://schemas.openxmlformats.org/presentationml/2006/main">
+  <p:cSld>
+    <p:spTree>
+      <p:nvGrpSpPr>
+        <p:cNvPr id="1" name=""/>
+        <p:cNvGrpSpPr/>
+        <p:nvPr/>
+      </p:nvGrpSpPr>
+      <p:grpSpPr>
+        <a:xfrm>
+          <a:off x="0" y="0"/>
+          <a:ext cx="0" cy="0"/>
+          <a:chOff x="0" y="0"/>
+          <a:chExt cx="0" cy="0"/>
+        </a:xfrm>
+      </p:grpSpPr>
+      <p:sp>
+        <p:nvSpPr>
+          <p:cNvPr id="2" name="Title 1">
+            <a:extLst>
+              <a:ext uri="{FF2B5EF4-FFF2-40B4-BE49-F238E27FC236}">
+                <a16:creationId xmlns:a16="http://schemas.microsoft.com/office/drawing/2014/main" id="{DED2C5EB-3A16-3529-F77E-016BF685F6C0}"/>
+              </a:ext>
+            </a:extLst>
+          </p:cNvPr>
+          <p:cNvSpPr>
+            <a:spLocks noGrp="1"/>
+          </p:cNvSpPr>
+          <p:nvPr>
+            <p:ph type="title"/>
+          </p:nvPr>
+        </p:nvSpPr>
+        <p:spPr/>
+        <p:txBody>
+          <a:bodyPr/>
+          <a:lstStyle/>
+          <a:p>
+            <a:r>
+              <a:rPr lang="en-US" dirty="0"/>
+              <a:t>The Law of Demeter – Hybrids</a:t>
+            </a:r>
+          </a:p>
+        </p:txBody>
+      </p:sp>
+      <p:sp>
+        <p:nvSpPr>
+          <p:cNvPr id="3" name="Content Placeholder 2">
+            <a:extLst>
+              <a:ext uri="{FF2B5EF4-FFF2-40B4-BE49-F238E27FC236}">
+                <a16:creationId xmlns:a16="http://schemas.microsoft.com/office/drawing/2014/main" id="{E1F34385-3936-8A70-6507-464375B41C34}"/>
+              </a:ext>
+            </a:extLst>
+          </p:cNvPr>
+          <p:cNvSpPr>
+            <a:spLocks noGrp="1"/>
+          </p:cNvSpPr>
+          <p:nvPr>
+            <p:ph idx="1"/>
+          </p:nvPr>
+        </p:nvSpPr>
+        <p:spPr/>
+        <p:txBody>
+          <a:bodyPr/>
+          <a:lstStyle/>
+          <a:p>
+            <a:endParaRPr lang="en-US" dirty="0"/>
+          </a:p>
+          <a:p>
+            <a:r>
+              <a:rPr lang="en-US" dirty="0"/>
+              <a:t>Previous confusion sometimes leads to unfortunate hybrid structures that are half objects and half data structure.</a:t>
+            </a:r>
+          </a:p>
+          <a:p>
+            <a:endParaRPr lang="en-US" dirty="0"/>
+          </a:p>
+          <a:p>
+            <a:r>
+              <a:rPr lang="en-US" dirty="0"/>
+              <a:t>Such hybrid make it hard to add new functions or new data structures.</a:t>
+            </a:r>
+          </a:p>
+        </p:txBody>
+      </p:sp>
+    </p:spTree>
+    <p:extLst>
+      <p:ext uri="{BB962C8B-B14F-4D97-AF65-F5344CB8AC3E}">
+        <p14:creationId xmlns:p14="http://schemas.microsoft.com/office/powerpoint/2010/main" val="2972597110"/>
       </p:ext>
     </p:extLst>
   </p:cSld>

</xml_diff>